<commit_message>
Minor Updates to icons and no feed simulation
</commit_message>
<xml_diff>
--- a/documents/sprint1/sprint-planning/Stock Tracker Design(with test explanation)- updated.pptx
+++ b/documents/sprint1/sprint-planning/Stock Tracker Design(with test explanation)- updated.pptx
@@ -295,7 +295,7 @@
             <a:fld id="{9B6738BD-9D67-424C-A095-1E992F6EB2E3}" type="datetimeFigureOut">
               <a:rPr lang="en-GB" smtClean="0"/>
               <a:pPr/>
-              <a:t>09/11/2012</a:t>
+              <a:t>13/11/2012</a:t>
             </a:fld>
             <a:endParaRPr lang="en-GB"/>
           </a:p>
@@ -467,7 +467,7 @@
             <a:fld id="{9B6738BD-9D67-424C-A095-1E992F6EB2E3}" type="datetimeFigureOut">
               <a:rPr lang="en-GB" smtClean="0"/>
               <a:pPr/>
-              <a:t>09/11/2012</a:t>
+              <a:t>13/11/2012</a:t>
             </a:fld>
             <a:endParaRPr lang="en-GB"/>
           </a:p>
@@ -649,7 +649,7 @@
             <a:fld id="{9B6738BD-9D67-424C-A095-1E992F6EB2E3}" type="datetimeFigureOut">
               <a:rPr lang="en-GB" smtClean="0"/>
               <a:pPr/>
-              <a:t>09/11/2012</a:t>
+              <a:t>13/11/2012</a:t>
             </a:fld>
             <a:endParaRPr lang="en-GB"/>
           </a:p>
@@ -821,7 +821,7 @@
             <a:fld id="{9B6738BD-9D67-424C-A095-1E992F6EB2E3}" type="datetimeFigureOut">
               <a:rPr lang="en-GB" smtClean="0"/>
               <a:pPr/>
-              <a:t>09/11/2012</a:t>
+              <a:t>13/11/2012</a:t>
             </a:fld>
             <a:endParaRPr lang="en-GB"/>
           </a:p>
@@ -1069,7 +1069,7 @@
             <a:fld id="{9B6738BD-9D67-424C-A095-1E992F6EB2E3}" type="datetimeFigureOut">
               <a:rPr lang="en-GB" smtClean="0"/>
               <a:pPr/>
-              <a:t>09/11/2012</a:t>
+              <a:t>13/11/2012</a:t>
             </a:fld>
             <a:endParaRPr lang="en-GB"/>
           </a:p>
@@ -1359,7 +1359,7 @@
             <a:fld id="{9B6738BD-9D67-424C-A095-1E992F6EB2E3}" type="datetimeFigureOut">
               <a:rPr lang="en-GB" smtClean="0"/>
               <a:pPr/>
-              <a:t>09/11/2012</a:t>
+              <a:t>13/11/2012</a:t>
             </a:fld>
             <a:endParaRPr lang="en-GB"/>
           </a:p>
@@ -1783,7 +1783,7 @@
             <a:fld id="{9B6738BD-9D67-424C-A095-1E992F6EB2E3}" type="datetimeFigureOut">
               <a:rPr lang="en-GB" smtClean="0"/>
               <a:pPr/>
-              <a:t>09/11/2012</a:t>
+              <a:t>13/11/2012</a:t>
             </a:fld>
             <a:endParaRPr lang="en-GB"/>
           </a:p>
@@ -1903,7 +1903,7 @@
             <a:fld id="{9B6738BD-9D67-424C-A095-1E992F6EB2E3}" type="datetimeFigureOut">
               <a:rPr lang="en-GB" smtClean="0"/>
               <a:pPr/>
-              <a:t>09/11/2012</a:t>
+              <a:t>13/11/2012</a:t>
             </a:fld>
             <a:endParaRPr lang="en-GB"/>
           </a:p>
@@ -2000,7 +2000,7 @@
             <a:fld id="{9B6738BD-9D67-424C-A095-1E992F6EB2E3}" type="datetimeFigureOut">
               <a:rPr lang="en-GB" smtClean="0"/>
               <a:pPr/>
-              <a:t>09/11/2012</a:t>
+              <a:t>13/11/2012</a:t>
             </a:fld>
             <a:endParaRPr lang="en-GB"/>
           </a:p>
@@ -2279,7 +2279,7 @@
             <a:fld id="{9B6738BD-9D67-424C-A095-1E992F6EB2E3}" type="datetimeFigureOut">
               <a:rPr lang="en-GB" smtClean="0"/>
               <a:pPr/>
-              <a:t>09/11/2012</a:t>
+              <a:t>13/11/2012</a:t>
             </a:fld>
             <a:endParaRPr lang="en-GB"/>
           </a:p>
@@ -2534,7 +2534,7 @@
             <a:fld id="{9B6738BD-9D67-424C-A095-1E992F6EB2E3}" type="datetimeFigureOut">
               <a:rPr lang="en-GB" smtClean="0"/>
               <a:pPr/>
-              <a:t>09/11/2012</a:t>
+              <a:t>13/11/2012</a:t>
             </a:fld>
             <a:endParaRPr lang="en-GB"/>
           </a:p>
@@ -2749,7 +2749,7 @@
             <a:fld id="{9B6738BD-9D67-424C-A095-1E992F6EB2E3}" type="datetimeFigureOut">
               <a:rPr lang="en-GB" smtClean="0"/>
               <a:pPr/>
-              <a:t>09/11/2012</a:t>
+              <a:t>13/11/2012</a:t>
             </a:fld>
             <a:endParaRPr lang="en-GB"/>
           </a:p>
@@ -6316,7 +6316,7 @@
           <a:p>
             <a:r>
               <a:rPr lang="en-US" dirty="0" smtClean="0"/>
-              <a:t>Weekly High and Low Value</a:t>
+              <a:t>Rocket or Plummet</a:t>
             </a:r>
             <a:endParaRPr lang="en-US" dirty="0"/>
           </a:p>
@@ -6339,7 +6339,9 @@
           </a:xfrm>
         </p:spPr>
         <p:txBody>
-          <a:bodyPr/>
+          <a:bodyPr>
+            <a:normAutofit fontScale="92500"/>
+          </a:bodyPr>
           <a:lstStyle/>
           <a:p>
             <a:r>
@@ -6350,12 +6352,19 @@
           <a:p>
             <a:r>
               <a:rPr lang="en-US" dirty="0" smtClean="0"/>
-              <a:t>Weekly high and low information presented as a dialogue when the user taps on </a:t>
-            </a:r>
-            <a:r>
-              <a:rPr lang="en-US" smtClean="0"/>
-              <a:t>the share.</a:t>
-            </a:r>
+              <a:t>If a rocket or plummet in price is found an appropriate icon is displayed next to the company name.  </a:t>
+            </a:r>
+          </a:p>
+          <a:p>
+            <a:r>
+              <a:rPr lang="en-US" dirty="0" smtClean="0"/>
+              <a:t>User can tap for details.</a:t>
+            </a:r>
+          </a:p>
+          <a:p>
+            <a:pPr marL="0" indent="0">
+              <a:buNone/>
+            </a:pPr>
             <a:endParaRPr lang="en-US" dirty="0"/>
           </a:p>
         </p:txBody>
@@ -7011,8 +7020,77 @@
                   <a:schemeClr val="tx1"/>
                 </a:solidFill>
               </a:rPr>
-              <a:t>BP Weekly Values:</a:t>
-            </a:r>
+              <a:t>BP Price Rocket:</a:t>
+            </a:r>
+            <a:endParaRPr lang="en-US" dirty="0" smtClean="0">
+              <a:solidFill>
+                <a:schemeClr val="tx1"/>
+              </a:solidFill>
+            </a:endParaRPr>
+          </a:p>
+          <a:p>
+            <a:pPr algn="ctr"/>
+            <a:r>
+              <a:rPr lang="en-US" dirty="0" smtClean="0">
+                <a:solidFill>
+                  <a:schemeClr val="tx1"/>
+                </a:solidFill>
+              </a:rPr>
+              <a:t>Value has rocketed by 12%</a:t>
+            </a:r>
+            <a:endParaRPr lang="en-US" dirty="0">
+              <a:solidFill>
+                <a:schemeClr val="tx1"/>
+              </a:solidFill>
+            </a:endParaRPr>
+          </a:p>
+          <a:p>
+            <a:pPr algn="ctr"/>
+            <a:r>
+              <a:rPr lang="en-US" dirty="0" smtClean="0">
+                <a:solidFill>
+                  <a:schemeClr val="tx1"/>
+                </a:solidFill>
+              </a:rPr>
+              <a:t>Opening</a:t>
+            </a:r>
+            <a:r>
+              <a:rPr lang="en-US" dirty="0" smtClean="0">
+                <a:solidFill>
+                  <a:schemeClr val="tx1"/>
+                </a:solidFill>
+              </a:rPr>
+              <a:t>: 100</a:t>
+            </a:r>
+            <a:endParaRPr lang="en-US" dirty="0" smtClean="0">
+              <a:solidFill>
+                <a:schemeClr val="tx1"/>
+              </a:solidFill>
+            </a:endParaRPr>
+          </a:p>
+          <a:p>
+            <a:pPr algn="ctr"/>
+            <a:r>
+              <a:rPr lang="en-US" dirty="0" smtClean="0">
+                <a:solidFill>
+                  <a:schemeClr val="tx1"/>
+                </a:solidFill>
+              </a:rPr>
+              <a:t>Current: </a:t>
+            </a:r>
+            <a:r>
+              <a:rPr lang="en-US" dirty="0" smtClean="0">
+                <a:solidFill>
+                  <a:schemeClr val="tx1"/>
+                </a:solidFill>
+              </a:rPr>
+              <a:t>112</a:t>
+            </a:r>
+            <a:endParaRPr lang="en-US" dirty="0" smtClean="0">
+              <a:solidFill>
+                <a:schemeClr val="tx1"/>
+              </a:solidFill>
+            </a:endParaRPr>
           </a:p>
           <a:p>
             <a:pPr algn="ctr"/>
@@ -7022,36 +7100,6 @@
               </a:solidFill>
             </a:endParaRPr>
           </a:p>
-          <a:p>
-            <a:pPr algn="ctr"/>
-            <a:r>
-              <a:rPr lang="en-US" dirty="0" smtClean="0">
-                <a:solidFill>
-                  <a:schemeClr val="tx1"/>
-                </a:solidFill>
-              </a:rPr>
-              <a:t>High: 5.12</a:t>
-            </a:r>
-          </a:p>
-          <a:p>
-            <a:pPr algn="ctr"/>
-            <a:r>
-              <a:rPr lang="en-US" dirty="0" smtClean="0">
-                <a:solidFill>
-                  <a:schemeClr val="tx1"/>
-                </a:solidFill>
-              </a:rPr>
-              <a:t>Low: 5.06</a:t>
-            </a:r>
-          </a:p>
-          <a:p>
-            <a:pPr algn="ctr"/>
-            <a:endParaRPr lang="en-US" dirty="0">
-              <a:solidFill>
-                <a:schemeClr val="tx1"/>
-              </a:solidFill>
-            </a:endParaRPr>
-          </a:p>
         </p:txBody>
       </p:sp>
       <p:sp>
@@ -7096,6 +7144,47 @@
           </a:p>
         </p:txBody>
       </p:sp>
+      <p:pic>
+        <p:nvPicPr>
+          <p:cNvPr id="1026" name="Picture 2" descr="C:\Users\jamesoliver\AppData\Local\Microsoft\Windows\Temporary Internet Files\Content.IE5\4TKPZ4RY\MC900017183[1].wmf"/>
+          <p:cNvPicPr>
+            <a:picLocks noChangeAspect="1" noChangeArrowheads="1"/>
+          </p:cNvPicPr>
+          <p:nvPr/>
+        </p:nvPicPr>
+        <p:blipFill>
+          <a:blip r:embed="rId3" cstate="print">
+            <a:extLst>
+              <a:ext uri="{28A0092B-C50C-407E-A947-70E740481C1C}">
+                <a14:useLocalDpi xmlns:a14="http://schemas.microsoft.com/office/drawing/2010/main" val="0"/>
+              </a:ext>
+            </a:extLst>
+          </a:blip>
+          <a:srcRect/>
+          <a:stretch>
+            <a:fillRect/>
+          </a:stretch>
+        </p:blipFill>
+        <p:spPr bwMode="auto">
+          <a:xfrm rot="2752093" flipH="1">
+            <a:off x="2123642" y="2485028"/>
+            <a:ext cx="144188" cy="542566"/>
+          </a:xfrm>
+          <a:prstGeom prst="rect">
+            <a:avLst/>
+          </a:prstGeom>
+          <a:noFill/>
+          <a:extLst>
+            <a:ext uri="{909E8E84-426E-40DD-AFC4-6F175D3DCCD1}">
+              <a14:hiddenFill xmlns:a14="http://schemas.microsoft.com/office/drawing/2010/main">
+                <a:solidFill>
+                  <a:srgbClr val="FFFFFF"/>
+                </a:solidFill>
+              </a14:hiddenFill>
+            </a:ext>
+          </a:extLst>
+        </p:spPr>
+      </p:pic>
     </p:spTree>
     <p:extLst>
       <p:ext uri="{BB962C8B-B14F-4D97-AF65-F5344CB8AC3E}">

</xml_diff>